<commit_message>
class00, class01: add links to p2p dma and fix typos.
</commit_message>
<xml_diff>
--- a/talks/src/class01.pptx
+++ b/talks/src/class01.pptx
@@ -230,7 +230,7 @@
           <a:p>
             <a:fld id="{56C6788E-680A-49E5-BB93-D456A9D23A29}" type="datetimeFigureOut">
               <a:rPr lang="ru-RU" smtClean="0"/>
-              <a:t>08.10.2024</a:t>
+              <a:t>17.10.2025</a:t>
             </a:fld>
             <a:endParaRPr lang="ru-RU"/>
           </a:p>
@@ -455,7 +455,7 @@
           <a:p>
             <a:fld id="{C4DF4945-C160-4CD5-B124-49B9BE14C0AB}" type="datetimeFigureOut">
               <a:rPr lang="ru-RU" smtClean="0"/>
-              <a:t>08.10.2024</a:t>
+              <a:t>17.10.2025</a:t>
             </a:fld>
             <a:endParaRPr lang="ru-RU"/>
           </a:p>
@@ -3717,7 +3717,7 @@
           <a:p>
             <a:fld id="{12C63722-5D9F-4E99-9720-9B6A0C7BB1C9}" type="datetimeFigureOut">
               <a:rPr lang="ru-RU" smtClean="0"/>
-              <a:t>08.10.2024</a:t>
+              <a:t>17.10.2025</a:t>
             </a:fld>
             <a:endParaRPr lang="ru-RU"/>
           </a:p>
@@ -3887,7 +3887,7 @@
           <a:p>
             <a:fld id="{12C63722-5D9F-4E99-9720-9B6A0C7BB1C9}" type="datetimeFigureOut">
               <a:rPr lang="ru-RU" smtClean="0"/>
-              <a:t>08.10.2024</a:t>
+              <a:t>17.10.2025</a:t>
             </a:fld>
             <a:endParaRPr lang="ru-RU"/>
           </a:p>
@@ -4067,7 +4067,7 @@
           <a:p>
             <a:fld id="{12C63722-5D9F-4E99-9720-9B6A0C7BB1C9}" type="datetimeFigureOut">
               <a:rPr lang="ru-RU" smtClean="0"/>
-              <a:t>08.10.2024</a:t>
+              <a:t>17.10.2025</a:t>
             </a:fld>
             <a:endParaRPr lang="ru-RU"/>
           </a:p>
@@ -4259,7 +4259,7 @@
           <a:p>
             <a:fld id="{8C218C88-2408-4CFC-B25C-07450930B282}" type="datetimeFigureOut">
               <a:rPr lang="ru-RU" smtClean="0"/>
-              <a:t>08.10.2024</a:t>
+              <a:t>17.10.2025</a:t>
             </a:fld>
             <a:endParaRPr lang="ru-RU"/>
           </a:p>
@@ -4429,7 +4429,7 @@
           <a:p>
             <a:fld id="{8C218C88-2408-4CFC-B25C-07450930B282}" type="datetimeFigureOut">
               <a:rPr lang="ru-RU" smtClean="0"/>
-              <a:t>08.10.2024</a:t>
+              <a:t>17.10.2025</a:t>
             </a:fld>
             <a:endParaRPr lang="ru-RU"/>
           </a:p>
@@ -4675,7 +4675,7 @@
           <a:p>
             <a:fld id="{8C218C88-2408-4CFC-B25C-07450930B282}" type="datetimeFigureOut">
               <a:rPr lang="ru-RU" smtClean="0"/>
-              <a:t>08.10.2024</a:t>
+              <a:t>17.10.2025</a:t>
             </a:fld>
             <a:endParaRPr lang="ru-RU"/>
           </a:p>
@@ -4907,7 +4907,7 @@
           <a:p>
             <a:fld id="{8C218C88-2408-4CFC-B25C-07450930B282}" type="datetimeFigureOut">
               <a:rPr lang="ru-RU" smtClean="0"/>
-              <a:t>08.10.2024</a:t>
+              <a:t>17.10.2025</a:t>
             </a:fld>
             <a:endParaRPr lang="ru-RU"/>
           </a:p>
@@ -5274,7 +5274,7 @@
           <a:p>
             <a:fld id="{8C218C88-2408-4CFC-B25C-07450930B282}" type="datetimeFigureOut">
               <a:rPr lang="ru-RU" smtClean="0"/>
-              <a:t>08.10.2024</a:t>
+              <a:t>17.10.2025</a:t>
             </a:fld>
             <a:endParaRPr lang="ru-RU"/>
           </a:p>
@@ -5392,7 +5392,7 @@
           <a:p>
             <a:fld id="{8C218C88-2408-4CFC-B25C-07450930B282}" type="datetimeFigureOut">
               <a:rPr lang="ru-RU" smtClean="0"/>
-              <a:t>08.10.2024</a:t>
+              <a:t>17.10.2025</a:t>
             </a:fld>
             <a:endParaRPr lang="ru-RU"/>
           </a:p>
@@ -5487,7 +5487,7 @@
           <a:p>
             <a:fld id="{8C218C88-2408-4CFC-B25C-07450930B282}" type="datetimeFigureOut">
               <a:rPr lang="ru-RU" smtClean="0"/>
-              <a:t>08.10.2024</a:t>
+              <a:t>17.10.2025</a:t>
             </a:fld>
             <a:endParaRPr lang="ru-RU"/>
           </a:p>
@@ -5764,7 +5764,7 @@
           <a:p>
             <a:fld id="{8C218C88-2408-4CFC-B25C-07450930B282}" type="datetimeFigureOut">
               <a:rPr lang="ru-RU" smtClean="0"/>
-              <a:t>08.10.2024</a:t>
+              <a:t>17.10.2025</a:t>
             </a:fld>
             <a:endParaRPr lang="ru-RU"/>
           </a:p>
@@ -5934,7 +5934,7 @@
           <a:p>
             <a:fld id="{12C63722-5D9F-4E99-9720-9B6A0C7BB1C9}" type="datetimeFigureOut">
               <a:rPr lang="ru-RU" smtClean="0"/>
-              <a:t>08.10.2024</a:t>
+              <a:t>17.10.2025</a:t>
             </a:fld>
             <a:endParaRPr lang="ru-RU"/>
           </a:p>
@@ -6187,7 +6187,7 @@
           <a:p>
             <a:fld id="{8C218C88-2408-4CFC-B25C-07450930B282}" type="datetimeFigureOut">
               <a:rPr lang="ru-RU" smtClean="0"/>
-              <a:t>08.10.2024</a:t>
+              <a:t>17.10.2025</a:t>
             </a:fld>
             <a:endParaRPr lang="ru-RU"/>
           </a:p>
@@ -6357,7 +6357,7 @@
           <a:p>
             <a:fld id="{8C218C88-2408-4CFC-B25C-07450930B282}" type="datetimeFigureOut">
               <a:rPr lang="ru-RU" smtClean="0"/>
-              <a:t>08.10.2024</a:t>
+              <a:t>17.10.2025</a:t>
             </a:fld>
             <a:endParaRPr lang="ru-RU"/>
           </a:p>
@@ -6537,7 +6537,7 @@
           <a:p>
             <a:fld id="{8C218C88-2408-4CFC-B25C-07450930B282}" type="datetimeFigureOut">
               <a:rPr lang="ru-RU" smtClean="0"/>
-              <a:t>08.10.2024</a:t>
+              <a:t>17.10.2025</a:t>
             </a:fld>
             <a:endParaRPr lang="ru-RU"/>
           </a:p>
@@ -6783,7 +6783,7 @@
           <a:p>
             <a:fld id="{12C63722-5D9F-4E99-9720-9B6A0C7BB1C9}" type="datetimeFigureOut">
               <a:rPr lang="ru-RU" smtClean="0"/>
-              <a:t>08.10.2024</a:t>
+              <a:t>17.10.2025</a:t>
             </a:fld>
             <a:endParaRPr lang="ru-RU"/>
           </a:p>
@@ -7023,7 +7023,7 @@
           <a:p>
             <a:fld id="{12C63722-5D9F-4E99-9720-9B6A0C7BB1C9}" type="datetimeFigureOut">
               <a:rPr lang="ru-RU" smtClean="0"/>
-              <a:t>08.10.2024</a:t>
+              <a:t>17.10.2025</a:t>
             </a:fld>
             <a:endParaRPr lang="ru-RU"/>
           </a:p>
@@ -7390,7 +7390,7 @@
           <a:p>
             <a:fld id="{12C63722-5D9F-4E99-9720-9B6A0C7BB1C9}" type="datetimeFigureOut">
               <a:rPr lang="ru-RU" smtClean="0"/>
-              <a:t>08.10.2024</a:t>
+              <a:t>17.10.2025</a:t>
             </a:fld>
             <a:endParaRPr lang="ru-RU"/>
           </a:p>
@@ -7508,7 +7508,7 @@
           <a:p>
             <a:fld id="{12C63722-5D9F-4E99-9720-9B6A0C7BB1C9}" type="datetimeFigureOut">
               <a:rPr lang="ru-RU" smtClean="0"/>
-              <a:t>08.10.2024</a:t>
+              <a:t>17.10.2025</a:t>
             </a:fld>
             <a:endParaRPr lang="ru-RU"/>
           </a:p>
@@ -7603,7 +7603,7 @@
           <a:p>
             <a:fld id="{12C63722-5D9F-4E99-9720-9B6A0C7BB1C9}" type="datetimeFigureOut">
               <a:rPr lang="ru-RU" smtClean="0"/>
-              <a:t>08.10.2024</a:t>
+              <a:t>17.10.2025</a:t>
             </a:fld>
             <a:endParaRPr lang="ru-RU"/>
           </a:p>
@@ -7880,7 +7880,7 @@
           <a:p>
             <a:fld id="{12C63722-5D9F-4E99-9720-9B6A0C7BB1C9}" type="datetimeFigureOut">
               <a:rPr lang="ru-RU" smtClean="0"/>
-              <a:t>08.10.2024</a:t>
+              <a:t>17.10.2025</a:t>
             </a:fld>
             <a:endParaRPr lang="ru-RU"/>
           </a:p>
@@ -8133,7 +8133,7 @@
           <a:p>
             <a:fld id="{12C63722-5D9F-4E99-9720-9B6A0C7BB1C9}" type="datetimeFigureOut">
               <a:rPr lang="ru-RU" smtClean="0"/>
-              <a:t>08.10.2024</a:t>
+              <a:t>17.10.2025</a:t>
             </a:fld>
             <a:endParaRPr lang="ru-RU"/>
           </a:p>
@@ -8346,7 +8346,7 @@
           <a:p>
             <a:fld id="{12C63722-5D9F-4E99-9720-9B6A0C7BB1C9}" type="datetimeFigureOut">
               <a:rPr lang="ru-RU" smtClean="0"/>
-              <a:t>08.10.2024</a:t>
+              <a:t>17.10.2025</a:t>
             </a:fld>
             <a:endParaRPr lang="ru-RU"/>
           </a:p>
@@ -8886,7 +8886,7 @@
           <a:p>
             <a:fld id="{8C218C88-2408-4CFC-B25C-07450930B282}" type="datetimeFigureOut">
               <a:rPr lang="ru-RU" smtClean="0"/>
-              <a:t>08.10.2024</a:t>
+              <a:t>17.10.2025</a:t>
             </a:fld>
             <a:endParaRPr lang="ru-RU"/>
           </a:p>
@@ -20062,7 +20062,7 @@
           <p:nvPr>
             <p:extLst>
               <p:ext uri="{D42A27DB-BD31-4B8C-83A1-F6EECF244321}">
-                <p14:modId xmlns:p14="http://schemas.microsoft.com/office/powerpoint/2010/main" val="2141793921"/>
+                <p14:modId xmlns:p14="http://schemas.microsoft.com/office/powerpoint/2010/main" val="4143187258"/>
               </p:ext>
             </p:extLst>
           </p:nvPr>
@@ -20560,7 +20560,7 @@
                           <a:ea typeface="Menlo" panose="020B0609030804020204" pitchFamily="49" charset="0"/>
                           <a:cs typeface="Menlo" panose="020B0609030804020204" pitchFamily="49" charset="0"/>
                         </a:rPr>
-                        <a:t>$ mount -t ext4 ./</a:t>
+                        <a:t>$ mount -t ext4 ~/</a:t>
                       </a:r>
                       <a:r>
                         <a:rPr lang="en-GB" sz="1400" dirty="0" err="1">
@@ -21159,7 +21159,7 @@
           <p:nvPr>
             <p:extLst>
               <p:ext uri="{D42A27DB-BD31-4B8C-83A1-F6EECF244321}">
-                <p14:modId xmlns:p14="http://schemas.microsoft.com/office/powerpoint/2010/main" val="412459468"/>
+                <p14:modId xmlns:p14="http://schemas.microsoft.com/office/powerpoint/2010/main" val="3356702361"/>
               </p:ext>
             </p:extLst>
           </p:nvPr>
@@ -21657,7 +21657,7 @@
                           <a:ea typeface="Menlo" panose="020B0609030804020204" pitchFamily="49" charset="0"/>
                           <a:cs typeface="Menlo" panose="020B0609030804020204" pitchFamily="49" charset="0"/>
                         </a:rPr>
-                        <a:t>$ mount -t ext4 ./</a:t>
+                        <a:t>$ mount -t ext4 ~/</a:t>
                       </a:r>
                       <a:r>
                         <a:rPr lang="en-GB" sz="1400" dirty="0" err="1">
@@ -23668,7 +23668,7 @@
           <p:nvPr>
             <p:extLst>
               <p:ext uri="{D42A27DB-BD31-4B8C-83A1-F6EECF244321}">
-                <p14:modId xmlns:p14="http://schemas.microsoft.com/office/powerpoint/2010/main" val="3414984189"/>
+                <p14:modId xmlns:p14="http://schemas.microsoft.com/office/powerpoint/2010/main" val="3656810969"/>
               </p:ext>
             </p:extLst>
           </p:nvPr>
@@ -23780,7 +23780,7 @@
                     <a:p>
                       <a:r>
                         <a:rPr lang="en-US" dirty="0"/>
-                        <a:t>FUSE file systems drivers open a pipe to the kernel-space FUSE layer. Over that pipe, they receive commands like “lookup a file in a directory”, “open a file”, “read/write data to a file”, etc.</a:t>
+                        <a:t>FUSE file system drivers open a pipe to the kernel-space FUSE layer. Over that pipe, they receive commands like “lookup a file in a directory”, “open a file”, “read/write data to a file”, etc.</a:t>
                       </a:r>
                     </a:p>
                     <a:p>
@@ -23801,7 +23801,15 @@
                       </a:r>
                       <a:r>
                         <a:rPr lang="en-US" dirty="0"/>
-                        <a:t>.</a:t>
+                        <a:t>, </a:t>
+                      </a:r>
+                      <a:r>
+                        <a:rPr lang="en-US" dirty="0" err="1"/>
+                        <a:t>Lustre</a:t>
+                      </a:r>
+                      <a:r>
+                        <a:rPr lang="en-US" dirty="0"/>
+                        <a:t>, CEPH.</a:t>
                       </a:r>
                     </a:p>
                     <a:p>

</xml_diff>